<commit_message>
Update 0529 project06 - 파워포인트 - 민기.pptx
</commit_message>
<xml_diff>
--- a/0 발표용 파워포인트/0529 4차발표/0529 project06 - 파워포인트 - 민기.pptx
+++ b/0 발표용 파워포인트/0529 4차발표/0529 project06 - 파워포인트 - 민기.pptx
@@ -8203,7 +8203,7 @@
         </p:nvSpPr>
         <p:spPr>
           <a:xfrm>
-            <a:off x="6629528" y="1571976"/>
+            <a:off x="5238738" y="1632808"/>
             <a:ext cx="4272323" cy="2139047"/>
           </a:xfrm>
           <a:prstGeom prst="rect">
@@ -8799,6 +8799,719 @@
           <a:p>
             <a:pPr algn="ctr"/>
             <a:endParaRPr lang="ko-KR" altLang="en-US"/>
+          </a:p>
+        </p:txBody>
+      </p:sp>
+      <p:sp>
+        <p:nvSpPr>
+          <p:cNvPr id="15" name="직사각형 14"/>
+          <p:cNvSpPr/>
+          <p:nvPr/>
+        </p:nvSpPr>
+        <p:spPr>
+          <a:xfrm>
+            <a:off x="5238738" y="4010466"/>
+            <a:ext cx="6310183" cy="2462213"/>
+          </a:xfrm>
+          <a:prstGeom prst="rect">
+            <a:avLst/>
+          </a:prstGeom>
+          <a:ln>
+            <a:solidFill>
+              <a:schemeClr val="tx1"/>
+            </a:solidFill>
+          </a:ln>
+        </p:spPr>
+        <p:txBody>
+          <a:bodyPr wrap="square">
+            <a:spAutoFit/>
+          </a:bodyPr>
+          <a:lstStyle/>
+          <a:p>
+            <a:r>
+              <a:rPr lang="en-US" altLang="ko-KR" sz="1400" dirty="0">
+                <a:solidFill>
+                  <a:srgbClr val="000000"/>
+                </a:solidFill>
+                <a:latin typeface="Consolas" panose="020B0609020204030204" pitchFamily="49" charset="0"/>
+              </a:rPr>
+              <a:t>$(</a:t>
+            </a:r>
+            <a:r>
+              <a:rPr lang="en-US" altLang="ko-KR" sz="1400" dirty="0">
+                <a:solidFill>
+                  <a:srgbClr val="2A00FF"/>
+                </a:solidFill>
+                <a:latin typeface="Consolas" panose="020B0609020204030204" pitchFamily="49" charset="0"/>
+              </a:rPr>
+              <a:t>"#</a:t>
+            </a:r>
+            <a:r>
+              <a:rPr lang="en-US" altLang="ko-KR" sz="1400" dirty="0" err="1">
+                <a:solidFill>
+                  <a:srgbClr val="2A00FF"/>
+                </a:solidFill>
+                <a:latin typeface="Consolas" panose="020B0609020204030204" pitchFamily="49" charset="0"/>
+              </a:rPr>
+              <a:t>gofun</a:t>
+            </a:r>
+            <a:r>
+              <a:rPr lang="en-US" altLang="ko-KR" sz="1400" dirty="0">
+                <a:solidFill>
+                  <a:srgbClr val="2A00FF"/>
+                </a:solidFill>
+                <a:latin typeface="Consolas" panose="020B0609020204030204" pitchFamily="49" charset="0"/>
+              </a:rPr>
+              <a:t>"</a:t>
+            </a:r>
+            <a:r>
+              <a:rPr lang="en-US" altLang="ko-KR" sz="1400" dirty="0">
+                <a:solidFill>
+                  <a:srgbClr val="000000"/>
+                </a:solidFill>
+                <a:latin typeface="Consolas" panose="020B0609020204030204" pitchFamily="49" charset="0"/>
+              </a:rPr>
+              <a:t>).click(</a:t>
+            </a:r>
+            <a:r>
+              <a:rPr lang="en-US" altLang="ko-KR" sz="1400" dirty="0">
+                <a:solidFill>
+                  <a:srgbClr val="7F0055"/>
+                </a:solidFill>
+                <a:latin typeface="Consolas" panose="020B0609020204030204" pitchFamily="49" charset="0"/>
+              </a:rPr>
+              <a:t>function</a:t>
+            </a:r>
+            <a:r>
+              <a:rPr lang="en-US" altLang="ko-KR" sz="1400" dirty="0">
+                <a:solidFill>
+                  <a:srgbClr val="000000"/>
+                </a:solidFill>
+                <a:latin typeface="Consolas" panose="020B0609020204030204" pitchFamily="49" charset="0"/>
+              </a:rPr>
+              <a:t>(){</a:t>
+            </a:r>
+          </a:p>
+          <a:p>
+            <a:r>
+              <a:rPr lang="en-US" altLang="ko-KR" sz="1400" dirty="0" smtClean="0">
+                <a:solidFill>
+                  <a:srgbClr val="7F0055"/>
+                </a:solidFill>
+                <a:latin typeface="Consolas" panose="020B0609020204030204" pitchFamily="49" charset="0"/>
+              </a:rPr>
+              <a:t>  if</a:t>
+            </a:r>
+            <a:r>
+              <a:rPr lang="en-US" altLang="ko-KR" sz="1400" dirty="0" smtClean="0">
+                <a:solidFill>
+                  <a:srgbClr val="000000"/>
+                </a:solidFill>
+                <a:latin typeface="Consolas" panose="020B0609020204030204" pitchFamily="49" charset="0"/>
+              </a:rPr>
+              <a:t>(</a:t>
+            </a:r>
+            <a:r>
+              <a:rPr lang="en-US" altLang="ko-KR" sz="1400" dirty="0" err="1" smtClean="0">
+                <a:solidFill>
+                  <a:srgbClr val="000000"/>
+                </a:solidFill>
+                <a:latin typeface="Consolas" panose="020B0609020204030204" pitchFamily="49" charset="0"/>
+              </a:rPr>
+              <a:t>mem_code</a:t>
+            </a:r>
+            <a:r>
+              <a:rPr lang="en-US" altLang="ko-KR" sz="1400" dirty="0" smtClean="0">
+                <a:solidFill>
+                  <a:srgbClr val="000000"/>
+                </a:solidFill>
+                <a:latin typeface="Consolas" panose="020B0609020204030204" pitchFamily="49" charset="0"/>
+              </a:rPr>
+              <a:t> </a:t>
+            </a:r>
+            <a:r>
+              <a:rPr lang="en-US" altLang="ko-KR" sz="1400" dirty="0">
+                <a:solidFill>
+                  <a:srgbClr val="000000"/>
+                </a:solidFill>
+                <a:latin typeface="Consolas" panose="020B0609020204030204" pitchFamily="49" charset="0"/>
+              </a:rPr>
+              <a:t>== </a:t>
+            </a:r>
+            <a:r>
+              <a:rPr lang="en-US" altLang="ko-KR" sz="1400" dirty="0">
+                <a:solidFill>
+                  <a:srgbClr val="2A00FF"/>
+                </a:solidFill>
+                <a:latin typeface="Consolas" panose="020B0609020204030204" pitchFamily="49" charset="0"/>
+              </a:rPr>
+              <a:t>""</a:t>
+            </a:r>
+            <a:r>
+              <a:rPr lang="en-US" altLang="ko-KR" sz="1400" dirty="0">
+                <a:solidFill>
+                  <a:srgbClr val="000000"/>
+                </a:solidFill>
+                <a:latin typeface="Consolas" panose="020B0609020204030204" pitchFamily="49" charset="0"/>
+              </a:rPr>
+              <a:t>){</a:t>
+            </a:r>
+          </a:p>
+          <a:p>
+            <a:r>
+              <a:rPr lang="ko-KR" altLang="en-US" sz="1400" dirty="0">
+                <a:solidFill>
+                  <a:srgbClr val="000000"/>
+                </a:solidFill>
+                <a:latin typeface="Consolas" panose="020B0609020204030204" pitchFamily="49" charset="0"/>
+              </a:rPr>
+              <a:t>  </a:t>
+            </a:r>
+            <a:r>
+              <a:rPr lang="ko-KR" altLang="en-US" sz="1400" dirty="0" smtClean="0">
+                <a:solidFill>
+                  <a:srgbClr val="000000"/>
+                </a:solidFill>
+                <a:latin typeface="Consolas" panose="020B0609020204030204" pitchFamily="49" charset="0"/>
+              </a:rPr>
+              <a:t>  </a:t>
+            </a:r>
+            <a:r>
+              <a:rPr lang="en-US" altLang="ko-KR" sz="1400" dirty="0" smtClean="0">
+                <a:solidFill>
+                  <a:srgbClr val="7F0055"/>
+                </a:solidFill>
+                <a:latin typeface="Consolas" panose="020B0609020204030204" pitchFamily="49" charset="0"/>
+              </a:rPr>
+              <a:t>if</a:t>
+            </a:r>
+            <a:r>
+              <a:rPr lang="en-US" altLang="ko-KR" sz="1400" dirty="0" smtClean="0">
+                <a:solidFill>
+                  <a:srgbClr val="000000"/>
+                </a:solidFill>
+                <a:latin typeface="Consolas" panose="020B0609020204030204" pitchFamily="49" charset="0"/>
+              </a:rPr>
+              <a:t>(confirm</a:t>
+            </a:r>
+            <a:r>
+              <a:rPr lang="en-US" altLang="ko-KR" sz="1400" dirty="0">
+                <a:solidFill>
+                  <a:srgbClr val="000000"/>
+                </a:solidFill>
+                <a:latin typeface="Consolas" panose="020B0609020204030204" pitchFamily="49" charset="0"/>
+              </a:rPr>
+              <a:t>(</a:t>
+            </a:r>
+            <a:r>
+              <a:rPr lang="en-US" altLang="ko-KR" sz="1400" dirty="0">
+                <a:solidFill>
+                  <a:srgbClr val="2A00FF"/>
+                </a:solidFill>
+                <a:latin typeface="Consolas" panose="020B0609020204030204" pitchFamily="49" charset="0"/>
+              </a:rPr>
+              <a:t>"</a:t>
+            </a:r>
+            <a:r>
+              <a:rPr lang="ko-KR" altLang="en-US" sz="1400" dirty="0" err="1">
+                <a:solidFill>
+                  <a:srgbClr val="2A00FF"/>
+                </a:solidFill>
+                <a:latin typeface="Consolas" panose="020B0609020204030204" pitchFamily="49" charset="0"/>
+              </a:rPr>
+              <a:t>로그인이</a:t>
+            </a:r>
+            <a:r>
+              <a:rPr lang="ko-KR" altLang="en-US" sz="1400" dirty="0">
+                <a:solidFill>
+                  <a:srgbClr val="2A00FF"/>
+                </a:solidFill>
+                <a:latin typeface="Consolas" panose="020B0609020204030204" pitchFamily="49" charset="0"/>
+              </a:rPr>
+              <a:t> 필요합니다</a:t>
+            </a:r>
+            <a:r>
+              <a:rPr lang="en-US" altLang="ko-KR" sz="1400" dirty="0">
+                <a:solidFill>
+                  <a:srgbClr val="2A00FF"/>
+                </a:solidFill>
+                <a:latin typeface="Consolas" panose="020B0609020204030204" pitchFamily="49" charset="0"/>
+              </a:rPr>
+              <a:t>."</a:t>
+            </a:r>
+            <a:r>
+              <a:rPr lang="en-US" altLang="ko-KR" sz="1400" dirty="0">
+                <a:solidFill>
+                  <a:srgbClr val="000000"/>
+                </a:solidFill>
+                <a:latin typeface="Consolas" panose="020B0609020204030204" pitchFamily="49" charset="0"/>
+              </a:rPr>
+              <a:t>)){</a:t>
+            </a:r>
+          </a:p>
+          <a:p>
+            <a:r>
+              <a:rPr lang="en-US" altLang="ko-KR" sz="1400" dirty="0">
+                <a:solidFill>
+                  <a:srgbClr val="000000"/>
+                </a:solidFill>
+                <a:latin typeface="Consolas" panose="020B0609020204030204" pitchFamily="49" charset="0"/>
+              </a:rPr>
+              <a:t>  </a:t>
+            </a:r>
+            <a:r>
+              <a:rPr lang="en-US" altLang="ko-KR" sz="1400" dirty="0" smtClean="0">
+                <a:solidFill>
+                  <a:srgbClr val="000000"/>
+                </a:solidFill>
+                <a:latin typeface="Consolas" panose="020B0609020204030204" pitchFamily="49" charset="0"/>
+              </a:rPr>
+              <a:t>    $(</a:t>
+            </a:r>
+            <a:r>
+              <a:rPr lang="en-US" altLang="ko-KR" sz="1400" dirty="0">
+                <a:solidFill>
+                  <a:srgbClr val="000000"/>
+                </a:solidFill>
+                <a:latin typeface="Consolas" panose="020B0609020204030204" pitchFamily="49" charset="0"/>
+              </a:rPr>
+              <a:t>location).</a:t>
+            </a:r>
+            <a:r>
+              <a:rPr lang="en-US" altLang="ko-KR" sz="1400" dirty="0" err="1">
+                <a:solidFill>
+                  <a:srgbClr val="000000"/>
+                </a:solidFill>
+                <a:latin typeface="Consolas" panose="020B0609020204030204" pitchFamily="49" charset="0"/>
+              </a:rPr>
+              <a:t>attr</a:t>
+            </a:r>
+            <a:r>
+              <a:rPr lang="en-US" altLang="ko-KR" sz="1400" dirty="0">
+                <a:solidFill>
+                  <a:srgbClr val="000000"/>
+                </a:solidFill>
+                <a:latin typeface="Consolas" panose="020B0609020204030204" pitchFamily="49" charset="0"/>
+              </a:rPr>
+              <a:t>(</a:t>
+            </a:r>
+            <a:r>
+              <a:rPr lang="en-US" altLang="ko-KR" sz="1400" dirty="0">
+                <a:solidFill>
+                  <a:srgbClr val="2A00FF"/>
+                </a:solidFill>
+                <a:latin typeface="Consolas" panose="020B0609020204030204" pitchFamily="49" charset="0"/>
+              </a:rPr>
+              <a:t>"</a:t>
+            </a:r>
+            <a:r>
+              <a:rPr lang="en-US" altLang="ko-KR" sz="1400" dirty="0" err="1">
+                <a:solidFill>
+                  <a:srgbClr val="2A00FF"/>
+                </a:solidFill>
+                <a:latin typeface="Consolas" panose="020B0609020204030204" pitchFamily="49" charset="0"/>
+              </a:rPr>
+              <a:t>href</a:t>
+            </a:r>
+            <a:r>
+              <a:rPr lang="en-US" altLang="ko-KR" sz="1400" dirty="0">
+                <a:solidFill>
+                  <a:srgbClr val="2A00FF"/>
+                </a:solidFill>
+                <a:latin typeface="Consolas" panose="020B0609020204030204" pitchFamily="49" charset="0"/>
+              </a:rPr>
+              <a:t>"</a:t>
+            </a:r>
+            <a:r>
+              <a:rPr lang="en-US" altLang="ko-KR" sz="1400" dirty="0">
+                <a:solidFill>
+                  <a:srgbClr val="000000"/>
+                </a:solidFill>
+                <a:latin typeface="Consolas" panose="020B0609020204030204" pitchFamily="49" charset="0"/>
+              </a:rPr>
+              <a:t>,</a:t>
+            </a:r>
+            <a:r>
+              <a:rPr lang="en-US" altLang="ko-KR" sz="1400" dirty="0">
+                <a:solidFill>
+                  <a:srgbClr val="2A00FF"/>
+                </a:solidFill>
+                <a:latin typeface="Consolas" panose="020B0609020204030204" pitchFamily="49" charset="0"/>
+              </a:rPr>
+              <a:t>"${path}/login.do"</a:t>
+            </a:r>
+            <a:r>
+              <a:rPr lang="en-US" altLang="ko-KR" sz="1400" dirty="0">
+                <a:solidFill>
+                  <a:srgbClr val="000000"/>
+                </a:solidFill>
+                <a:latin typeface="Consolas" panose="020B0609020204030204" pitchFamily="49" charset="0"/>
+              </a:rPr>
+              <a:t>);</a:t>
+            </a:r>
+          </a:p>
+          <a:p>
+            <a:r>
+              <a:rPr lang="ko-KR" altLang="en-US" sz="1400" dirty="0">
+                <a:solidFill>
+                  <a:srgbClr val="000000"/>
+                </a:solidFill>
+                <a:latin typeface="Consolas" panose="020B0609020204030204" pitchFamily="49" charset="0"/>
+              </a:rPr>
+              <a:t>  </a:t>
+            </a:r>
+            <a:r>
+              <a:rPr lang="ko-KR" altLang="en-US" sz="1400" dirty="0" smtClean="0">
+                <a:solidFill>
+                  <a:srgbClr val="000000"/>
+                </a:solidFill>
+                <a:latin typeface="Consolas" panose="020B0609020204030204" pitchFamily="49" charset="0"/>
+              </a:rPr>
+              <a:t>  </a:t>
+            </a:r>
+            <a:r>
+              <a:rPr lang="en-US" altLang="ko-KR" sz="1400" dirty="0" smtClean="0">
+                <a:solidFill>
+                  <a:srgbClr val="000000"/>
+                </a:solidFill>
+                <a:latin typeface="Consolas" panose="020B0609020204030204" pitchFamily="49" charset="0"/>
+              </a:rPr>
+              <a:t>}</a:t>
+            </a:r>
+            <a:endParaRPr lang="en-US" altLang="ko-KR" sz="1400" dirty="0">
+              <a:solidFill>
+                <a:srgbClr val="000000"/>
+              </a:solidFill>
+              <a:latin typeface="Consolas" panose="020B0609020204030204" pitchFamily="49" charset="0"/>
+            </a:endParaRPr>
+          </a:p>
+          <a:p>
+            <a:r>
+              <a:rPr lang="en-US" altLang="ko-KR" sz="1400" dirty="0">
+                <a:solidFill>
+                  <a:srgbClr val="000000"/>
+                </a:solidFill>
+                <a:latin typeface="Consolas" panose="020B0609020204030204" pitchFamily="49" charset="0"/>
+              </a:rPr>
+              <a:t>  } </a:t>
+            </a:r>
+            <a:r>
+              <a:rPr lang="en-US" altLang="ko-KR" sz="1400" dirty="0">
+                <a:solidFill>
+                  <a:srgbClr val="7F0055"/>
+                </a:solidFill>
+                <a:latin typeface="Consolas" panose="020B0609020204030204" pitchFamily="49" charset="0"/>
+              </a:rPr>
+              <a:t>else</a:t>
+            </a:r>
+            <a:r>
+              <a:rPr lang="en-US" altLang="ko-KR" sz="1400" dirty="0">
+                <a:solidFill>
+                  <a:srgbClr val="000000"/>
+                </a:solidFill>
+                <a:latin typeface="Consolas" panose="020B0609020204030204" pitchFamily="49" charset="0"/>
+              </a:rPr>
+              <a:t>{</a:t>
+            </a:r>
+          </a:p>
+          <a:p>
+            <a:r>
+              <a:rPr lang="en-US" altLang="ko-KR" sz="1400" dirty="0">
+                <a:solidFill>
+                  <a:srgbClr val="000000"/>
+                </a:solidFill>
+                <a:latin typeface="Consolas" panose="020B0609020204030204" pitchFamily="49" charset="0"/>
+              </a:rPr>
+              <a:t>  </a:t>
+            </a:r>
+            <a:r>
+              <a:rPr lang="en-US" altLang="ko-KR" sz="1400" dirty="0" smtClean="0">
+                <a:solidFill>
+                  <a:srgbClr val="000000"/>
+                </a:solidFill>
+                <a:latin typeface="Consolas" panose="020B0609020204030204" pitchFamily="49" charset="0"/>
+              </a:rPr>
+              <a:t>  </a:t>
+            </a:r>
+            <a:r>
+              <a:rPr lang="en-US" altLang="ko-KR" sz="1400" dirty="0" err="1" smtClean="0">
+                <a:solidFill>
+                  <a:srgbClr val="7F0055"/>
+                </a:solidFill>
+                <a:latin typeface="Consolas" panose="020B0609020204030204" pitchFamily="49" charset="0"/>
+              </a:rPr>
+              <a:t>var</a:t>
+            </a:r>
+            <a:r>
+              <a:rPr lang="en-US" altLang="ko-KR" sz="1400" dirty="0" smtClean="0">
+                <a:solidFill>
+                  <a:srgbClr val="000000"/>
+                </a:solidFill>
+                <a:latin typeface="Consolas" panose="020B0609020204030204" pitchFamily="49" charset="0"/>
+              </a:rPr>
+              <a:t> </a:t>
+            </a:r>
+            <a:r>
+              <a:rPr lang="en-US" altLang="ko-KR" sz="1400" dirty="0">
+                <a:solidFill>
+                  <a:srgbClr val="000000"/>
+                </a:solidFill>
+                <a:latin typeface="Consolas" panose="020B0609020204030204" pitchFamily="49" charset="0"/>
+              </a:rPr>
+              <a:t>no = $(</a:t>
+            </a:r>
+            <a:r>
+              <a:rPr lang="en-US" altLang="ko-KR" sz="1400" dirty="0">
+                <a:solidFill>
+                  <a:srgbClr val="2A00FF"/>
+                </a:solidFill>
+                <a:latin typeface="Consolas" panose="020B0609020204030204" pitchFamily="49" charset="0"/>
+              </a:rPr>
+              <a:t>"[name=</a:t>
+            </a:r>
+            <a:r>
+              <a:rPr lang="en-US" altLang="ko-KR" sz="1400" dirty="0" err="1">
+                <a:solidFill>
+                  <a:srgbClr val="2A00FF"/>
+                </a:solidFill>
+                <a:latin typeface="Consolas" panose="020B0609020204030204" pitchFamily="49" charset="0"/>
+              </a:rPr>
+              <a:t>pro_code</a:t>
+            </a:r>
+            <a:r>
+              <a:rPr lang="en-US" altLang="ko-KR" sz="1400" dirty="0">
+                <a:solidFill>
+                  <a:srgbClr val="2A00FF"/>
+                </a:solidFill>
+                <a:latin typeface="Consolas" panose="020B0609020204030204" pitchFamily="49" charset="0"/>
+              </a:rPr>
+              <a:t>]"</a:t>
+            </a:r>
+            <a:r>
+              <a:rPr lang="en-US" altLang="ko-KR" sz="1400" dirty="0">
+                <a:solidFill>
+                  <a:srgbClr val="000000"/>
+                </a:solidFill>
+                <a:latin typeface="Consolas" panose="020B0609020204030204" pitchFamily="49" charset="0"/>
+              </a:rPr>
+              <a:t>).</a:t>
+            </a:r>
+            <a:r>
+              <a:rPr lang="en-US" altLang="ko-KR" sz="1400" dirty="0" err="1">
+                <a:solidFill>
+                  <a:srgbClr val="000000"/>
+                </a:solidFill>
+                <a:latin typeface="Consolas" panose="020B0609020204030204" pitchFamily="49" charset="0"/>
+              </a:rPr>
+              <a:t>val</a:t>
+            </a:r>
+            <a:r>
+              <a:rPr lang="en-US" altLang="ko-KR" sz="1400" dirty="0">
+                <a:solidFill>
+                  <a:srgbClr val="000000"/>
+                </a:solidFill>
+                <a:latin typeface="Consolas" panose="020B0609020204030204" pitchFamily="49" charset="0"/>
+              </a:rPr>
+              <a:t>();</a:t>
+            </a:r>
+          </a:p>
+          <a:p>
+            <a:r>
+              <a:rPr lang="en-US" altLang="ko-KR" sz="1400" dirty="0">
+                <a:solidFill>
+                  <a:srgbClr val="000000"/>
+                </a:solidFill>
+                <a:latin typeface="Consolas" panose="020B0609020204030204" pitchFamily="49" charset="0"/>
+              </a:rPr>
+              <a:t> </a:t>
+            </a:r>
+            <a:r>
+              <a:rPr lang="en-US" altLang="ko-KR" sz="1400" dirty="0" smtClean="0">
+                <a:solidFill>
+                  <a:srgbClr val="000000"/>
+                </a:solidFill>
+                <a:latin typeface="Consolas" panose="020B0609020204030204" pitchFamily="49" charset="0"/>
+              </a:rPr>
+              <a:t>   $(</a:t>
+            </a:r>
+            <a:r>
+              <a:rPr lang="en-US" altLang="ko-KR" sz="1400" dirty="0">
+                <a:solidFill>
+                  <a:srgbClr val="000000"/>
+                </a:solidFill>
+                <a:latin typeface="Consolas" panose="020B0609020204030204" pitchFamily="49" charset="0"/>
+              </a:rPr>
+              <a:t>location).</a:t>
+            </a:r>
+            <a:r>
+              <a:rPr lang="en-US" altLang="ko-KR" sz="1400" dirty="0" err="1">
+                <a:solidFill>
+                  <a:srgbClr val="000000"/>
+                </a:solidFill>
+                <a:latin typeface="Consolas" panose="020B0609020204030204" pitchFamily="49" charset="0"/>
+              </a:rPr>
+              <a:t>attr</a:t>
+            </a:r>
+            <a:r>
+              <a:rPr lang="en-US" altLang="ko-KR" sz="1400" dirty="0">
+                <a:solidFill>
+                  <a:srgbClr val="000000"/>
+                </a:solidFill>
+                <a:latin typeface="Consolas" panose="020B0609020204030204" pitchFamily="49" charset="0"/>
+              </a:rPr>
+              <a:t>(</a:t>
+            </a:r>
+            <a:r>
+              <a:rPr lang="en-US" altLang="ko-KR" sz="1400" dirty="0">
+                <a:solidFill>
+                  <a:srgbClr val="2A00FF"/>
+                </a:solidFill>
+                <a:latin typeface="Consolas" panose="020B0609020204030204" pitchFamily="49" charset="0"/>
+              </a:rPr>
+              <a:t>"</a:t>
+            </a:r>
+            <a:r>
+              <a:rPr lang="en-US" altLang="ko-KR" sz="1400" dirty="0" err="1">
+                <a:solidFill>
+                  <a:srgbClr val="2A00FF"/>
+                </a:solidFill>
+                <a:latin typeface="Consolas" panose="020B0609020204030204" pitchFamily="49" charset="0"/>
+              </a:rPr>
+              <a:t>href</a:t>
+            </a:r>
+            <a:r>
+              <a:rPr lang="en-US" altLang="ko-KR" sz="1400" dirty="0" smtClean="0">
+                <a:solidFill>
+                  <a:srgbClr val="2A00FF"/>
+                </a:solidFill>
+                <a:latin typeface="Consolas" panose="020B0609020204030204" pitchFamily="49" charset="0"/>
+              </a:rPr>
+              <a:t>"</a:t>
+            </a:r>
+            <a:r>
+              <a:rPr lang="en-US" altLang="ko-KR" sz="1400" dirty="0" smtClean="0">
+                <a:solidFill>
+                  <a:srgbClr val="000000"/>
+                </a:solidFill>
+                <a:latin typeface="Consolas" panose="020B0609020204030204" pitchFamily="49" charset="0"/>
+              </a:rPr>
+              <a:t>,</a:t>
+            </a:r>
+          </a:p>
+          <a:p>
+            <a:r>
+              <a:rPr lang="en-US" altLang="ko-KR" sz="1400" dirty="0">
+                <a:solidFill>
+                  <a:srgbClr val="000000"/>
+                </a:solidFill>
+                <a:latin typeface="Consolas" panose="020B0609020204030204" pitchFamily="49" charset="0"/>
+              </a:rPr>
+              <a:t> </a:t>
+            </a:r>
+            <a:r>
+              <a:rPr lang="en-US" altLang="ko-KR" sz="1400" dirty="0" smtClean="0">
+                <a:solidFill>
+                  <a:srgbClr val="000000"/>
+                </a:solidFill>
+                <a:latin typeface="Consolas" panose="020B0609020204030204" pitchFamily="49" charset="0"/>
+              </a:rPr>
+              <a:t>            </a:t>
+            </a:r>
+            <a:r>
+              <a:rPr lang="en-US" altLang="ko-KR" sz="1400" dirty="0" smtClean="0">
+                <a:solidFill>
+                  <a:srgbClr val="2A00FF"/>
+                </a:solidFill>
+                <a:latin typeface="Consolas" panose="020B0609020204030204" pitchFamily="49" charset="0"/>
+              </a:rPr>
+              <a:t>"${</a:t>
+            </a:r>
+            <a:r>
+              <a:rPr lang="en-US" altLang="ko-KR" sz="1400" dirty="0">
+                <a:solidFill>
+                  <a:srgbClr val="2A00FF"/>
+                </a:solidFill>
+                <a:latin typeface="Consolas" panose="020B0609020204030204" pitchFamily="49" charset="0"/>
+              </a:rPr>
+              <a:t>path}/</a:t>
+            </a:r>
+            <a:r>
+              <a:rPr lang="en-US" altLang="ko-KR" sz="1400" dirty="0" err="1">
+                <a:solidFill>
+                  <a:srgbClr val="2A00FF"/>
+                </a:solidFill>
+                <a:latin typeface="Consolas" panose="020B0609020204030204" pitchFamily="49" charset="0"/>
+              </a:rPr>
+              <a:t>funding.do?method</a:t>
+            </a:r>
+            <a:r>
+              <a:rPr lang="en-US" altLang="ko-KR" sz="1400" dirty="0">
+                <a:solidFill>
+                  <a:srgbClr val="2A00FF"/>
+                </a:solidFill>
+                <a:latin typeface="Consolas" panose="020B0609020204030204" pitchFamily="49" charset="0"/>
+              </a:rPr>
+              <a:t>=</a:t>
+            </a:r>
+            <a:r>
+              <a:rPr lang="en-US" altLang="ko-KR" sz="1400" dirty="0" err="1">
+                <a:solidFill>
+                  <a:srgbClr val="2A00FF"/>
+                </a:solidFill>
+                <a:latin typeface="Consolas" panose="020B0609020204030204" pitchFamily="49" charset="0"/>
+              </a:rPr>
+              <a:t>option&amp;pro_code</a:t>
+            </a:r>
+            <a:r>
+              <a:rPr lang="en-US" altLang="ko-KR" sz="1400" dirty="0">
+                <a:solidFill>
+                  <a:srgbClr val="2A00FF"/>
+                </a:solidFill>
+                <a:latin typeface="Consolas" panose="020B0609020204030204" pitchFamily="49" charset="0"/>
+              </a:rPr>
+              <a:t>="</a:t>
+            </a:r>
+            <a:r>
+              <a:rPr lang="en-US" altLang="ko-KR" sz="1400" dirty="0">
+                <a:solidFill>
+                  <a:srgbClr val="000000"/>
+                </a:solidFill>
+                <a:latin typeface="Consolas" panose="020B0609020204030204" pitchFamily="49" charset="0"/>
+              </a:rPr>
+              <a:t>+no);</a:t>
+            </a:r>
+          </a:p>
+          <a:p>
+            <a:r>
+              <a:rPr lang="ko-KR" altLang="en-US" sz="1400" dirty="0">
+                <a:solidFill>
+                  <a:srgbClr val="000000"/>
+                </a:solidFill>
+                <a:latin typeface="Consolas" panose="020B0609020204030204" pitchFamily="49" charset="0"/>
+              </a:rPr>
+              <a:t>  </a:t>
+            </a:r>
+            <a:r>
+              <a:rPr lang="en-US" altLang="ko-KR" sz="1400" dirty="0">
+                <a:solidFill>
+                  <a:srgbClr val="000000"/>
+                </a:solidFill>
+                <a:latin typeface="Consolas" panose="020B0609020204030204" pitchFamily="49" charset="0"/>
+              </a:rPr>
+              <a:t>}</a:t>
+            </a:r>
+          </a:p>
+          <a:p>
+            <a:r>
+              <a:rPr lang="en-US" altLang="ko-KR" sz="1400" dirty="0">
+                <a:solidFill>
+                  <a:srgbClr val="000000"/>
+                </a:solidFill>
+                <a:latin typeface="Consolas" panose="020B0609020204030204" pitchFamily="49" charset="0"/>
+              </a:rPr>
+              <a:t>});</a:t>
+            </a:r>
+            <a:endParaRPr lang="ko-KR" altLang="en-US" sz="1400" dirty="0"/>
           </a:p>
         </p:txBody>
       </p:sp>
@@ -10066,6 +10779,84 @@
           </a:p>
         </p:txBody>
       </p:sp>
+      <p:cxnSp>
+        <p:nvCxnSpPr>
+          <p:cNvPr id="22" name="꺾인 연결선 21"/>
+          <p:cNvCxnSpPr>
+            <a:stCxn id="16" idx="3"/>
+            <a:endCxn id="15" idx="1"/>
+          </p:cNvCxnSpPr>
+          <p:nvPr/>
+        </p:nvCxnSpPr>
+        <p:spPr>
+          <a:xfrm>
+            <a:off x="6944499" y="1767755"/>
+            <a:ext cx="954161" cy="787435"/>
+          </a:xfrm>
+          <a:prstGeom prst="bentConnector3">
+            <a:avLst/>
+          </a:prstGeom>
+          <a:ln w="28575">
+            <a:solidFill>
+              <a:srgbClr val="FF0000"/>
+            </a:solidFill>
+            <a:tailEnd type="triangle"/>
+          </a:ln>
+        </p:spPr>
+        <p:style>
+          <a:lnRef idx="1">
+            <a:schemeClr val="accent1"/>
+          </a:lnRef>
+          <a:fillRef idx="0">
+            <a:schemeClr val="accent1"/>
+          </a:fillRef>
+          <a:effectRef idx="0">
+            <a:schemeClr val="accent1"/>
+          </a:effectRef>
+          <a:fontRef idx="minor">
+            <a:schemeClr val="tx1"/>
+          </a:fontRef>
+        </p:style>
+      </p:cxnSp>
+      <p:cxnSp>
+        <p:nvCxnSpPr>
+          <p:cNvPr id="24" name="꺾인 연결선 23"/>
+          <p:cNvCxnSpPr>
+            <a:stCxn id="17" idx="2"/>
+            <a:endCxn id="14" idx="0"/>
+          </p:cNvCxnSpPr>
+          <p:nvPr/>
+        </p:nvCxnSpPr>
+        <p:spPr>
+          <a:xfrm rot="5400000">
+            <a:off x="3284159" y="3462931"/>
+            <a:ext cx="838519" cy="156937"/>
+          </a:xfrm>
+          <a:prstGeom prst="bentConnector3">
+            <a:avLst/>
+          </a:prstGeom>
+          <a:ln w="28575">
+            <a:solidFill>
+              <a:srgbClr val="FF0000"/>
+            </a:solidFill>
+            <a:tailEnd type="triangle"/>
+          </a:ln>
+        </p:spPr>
+        <p:style>
+          <a:lnRef idx="1">
+            <a:schemeClr val="accent1"/>
+          </a:lnRef>
+          <a:fillRef idx="0">
+            <a:schemeClr val="accent1"/>
+          </a:fillRef>
+          <a:effectRef idx="0">
+            <a:schemeClr val="accent1"/>
+          </a:effectRef>
+          <a:fontRef idx="minor">
+            <a:schemeClr val="tx1"/>
+          </a:fontRef>
+        </p:style>
+      </p:cxnSp>
     </p:spTree>
     <p:extLst>
       <p:ext uri="{BB962C8B-B14F-4D97-AF65-F5344CB8AC3E}">
@@ -11153,6 +11944,85 @@
           </a:prstGeom>
         </p:spPr>
       </p:pic>
+      <p:cxnSp>
+        <p:nvCxnSpPr>
+          <p:cNvPr id="16" name="꺾인 연결선 15"/>
+          <p:cNvCxnSpPr>
+            <a:stCxn id="14" idx="2"/>
+            <a:endCxn id="3" idx="0"/>
+          </p:cNvCxnSpPr>
+          <p:nvPr/>
+        </p:nvCxnSpPr>
+        <p:spPr>
+          <a:xfrm rot="16200000" flipH="1">
+            <a:off x="3857758" y="4161395"/>
+            <a:ext cx="303355" cy="1316036"/>
+          </a:xfrm>
+          <a:prstGeom prst="bentConnector3">
+            <a:avLst/>
+          </a:prstGeom>
+          <a:ln w="28575">
+            <a:solidFill>
+              <a:srgbClr val="FF0000"/>
+            </a:solidFill>
+            <a:tailEnd type="triangle"/>
+          </a:ln>
+        </p:spPr>
+        <p:style>
+          <a:lnRef idx="1">
+            <a:schemeClr val="accent1"/>
+          </a:lnRef>
+          <a:fillRef idx="0">
+            <a:schemeClr val="accent1"/>
+          </a:fillRef>
+          <a:effectRef idx="0">
+            <a:schemeClr val="accent1"/>
+          </a:effectRef>
+          <a:fontRef idx="minor">
+            <a:schemeClr val="tx1"/>
+          </a:fontRef>
+        </p:style>
+      </p:cxnSp>
+      <p:cxnSp>
+        <p:nvCxnSpPr>
+          <p:cNvPr id="20" name="꺾인 연결선 19"/>
+          <p:cNvCxnSpPr>
+            <a:endCxn id="15" idx="2"/>
+          </p:cNvCxnSpPr>
+          <p:nvPr/>
+        </p:nvCxnSpPr>
+        <p:spPr>
+          <a:xfrm rot="5400000" flipH="1" flipV="1">
+            <a:off x="8001793" y="4301910"/>
+            <a:ext cx="1980709" cy="618933"/>
+          </a:xfrm>
+          <a:prstGeom prst="bentConnector3">
+            <a:avLst>
+              <a:gd name="adj1" fmla="val 508"/>
+            </a:avLst>
+          </a:prstGeom>
+          <a:ln w="28575">
+            <a:solidFill>
+              <a:srgbClr val="FF0000"/>
+            </a:solidFill>
+            <a:tailEnd type="triangle"/>
+          </a:ln>
+        </p:spPr>
+        <p:style>
+          <a:lnRef idx="1">
+            <a:schemeClr val="accent1"/>
+          </a:lnRef>
+          <a:fillRef idx="0">
+            <a:schemeClr val="accent1"/>
+          </a:fillRef>
+          <a:effectRef idx="0">
+            <a:schemeClr val="accent1"/>
+          </a:effectRef>
+          <a:fontRef idx="minor">
+            <a:schemeClr val="tx1"/>
+          </a:fontRef>
+        </p:style>
+      </p:cxnSp>
     </p:spTree>
     <p:extLst>
       <p:ext uri="{BB962C8B-B14F-4D97-AF65-F5344CB8AC3E}">

</xml_diff>